<commit_message>
remake thema 8 slides
</commit_message>
<xml_diff>
--- a/Skript-Folien/QM1-Thema08.pptx
+++ b/Skript-Folien/QM1-Thema08.pptx
@@ -9366,7 +9366,7 @@
       </p:grpSpPr>
       <p:sp>
         <p:nvSpPr>
-          <p:cNvPr id="391" name="Typische Diagramme in der Statistik"/>
+          <p:cNvPr id="391" name="Typische Diagramme in der Statistik, Beispiele"/>
           <p:cNvSpPr txBox="1"/>
           <p:nvPr>
             <p:ph type="body" sz="quarter" idx="1"/>
@@ -9383,7 +9383,7 @@
           <a:p>
             <a:pPr/>
             <a:r>
-              <a:t>Typische Diagramme in der Statistik</a:t>
+              <a:t>Typische Diagramme in der Statistik, Beispiele</a:t>
             </a:r>
           </a:p>
         </p:txBody>
@@ -13414,7 +13414,7 @@
       </p:grpSpPr>
       <p:sp>
         <p:nvSpPr>
-          <p:cNvPr id="361" name="Einige Gnome"/>
+          <p:cNvPr id="361" name="Einige Geome"/>
           <p:cNvSpPr txBox="1"/>
           <p:nvPr>
             <p:ph type="body" sz="quarter" idx="1"/>
@@ -13431,7 +13431,7 @@
           <a:p>
             <a:pPr/>
             <a:r>
-              <a:t>Einige Gnome</a:t>
+              <a:t>Einige Geome </a:t>
             </a:r>
           </a:p>
         </p:txBody>

</xml_diff>